<commit_message>
commit PDF lesson 1
</commit_message>
<xml_diff>
--- a/1-Lessons/Lesson01/OriginalPowerpoint/Class&SyllabusIntroduction-ENGR1330-CTwithDS.pptx
+++ b/1-Lessons/Lesson01/OriginalPowerpoint/Class&SyllabusIntroduction-ENGR1330-CTwithDS.pptx
@@ -181,7 +181,7 @@
       </p14:sectionLst>
     </p:ext>
     <p:ext uri="{EFAFB233-063F-42B5-8137-9DF3F51BA10A}">
-      <p15:sldGuideLst xmlns:p15="http://schemas.microsoft.com/office/powerpoint/2012/main">
+      <p15:sldGuideLst xmlns:p15="http://schemas.microsoft.com/office/powerpoint/2012/main" xmlns="">
         <p15:guide id="1" orient="horz" pos="2160">
           <p15:clr>
             <a:srgbClr val="A4A3A4"/>
@@ -195,7 +195,7 @@
       </p15:sldGuideLst>
     </p:ext>
     <p:ext uri="{2D200454-40CA-4A62-9FC3-DE9A4176ACB9}">
-      <p15:notesGuideLst xmlns:p15="http://schemas.microsoft.com/office/powerpoint/2012/main">
+      <p15:notesGuideLst xmlns:p15="http://schemas.microsoft.com/office/powerpoint/2012/main" xmlns="">
         <p15:guide id="1" orient="horz" pos="2909" userDrawn="1">
           <p15:clr>
             <a:srgbClr val="A4A3A4"/>
@@ -303,7 +303,7 @@
             <a:fld id="{6E3A8D32-36C6-4B09-BCB3-215C06D7D31C}" type="datetimeFigureOut">
               <a:rPr lang="en-US" smtClean="0"/>
               <a:pPr/>
-              <a:t>8/16/2020</a:t>
+              <a:t>8/23/20</a:t>
             </a:fld>
             <a:endParaRPr lang="en-US"/>
           </a:p>
@@ -494,7 +494,7 @@
               <a:pPr>
                 <a:defRPr/>
               </a:pPr>
-              <a:t>8/16/2020</a:t>
+              <a:t>8/23/20</a:t>
             </a:fld>
             <a:endParaRPr lang="en-US"/>
           </a:p>
@@ -1062,14 +1062,14 @@
           </a:ln>
           <a:extLst>
             <a:ext uri="{909E8E84-426E-40dd-AFC4-6F175D3DCCD1}">
-              <a14:hiddenFill xmlns:a14="http://schemas.microsoft.com/office/drawing/2010/main" xmlns="">
+              <a14:hiddenFill xmlns:a14="http://schemas.microsoft.com/office/drawing/2010/main">
                 <a:solidFill>
                   <a:srgbClr val="FFFFFF"/>
                 </a:solidFill>
               </a14:hiddenFill>
             </a:ext>
             <a:ext uri="{91240B29-F687-4f45-9708-019B960494DF}">
-              <a14:hiddenLine xmlns:a14="http://schemas.microsoft.com/office/drawing/2010/main" xmlns="" w="9525">
+              <a14:hiddenLine xmlns:a14="http://schemas.microsoft.com/office/drawing/2010/main" w="9525">
                 <a:solidFill>
                   <a:srgbClr val="000000"/>
                 </a:solidFill>
@@ -1396,14 +1396,14 @@
           </a:ln>
           <a:extLst>
             <a:ext uri="{909E8E84-426E-40dd-AFC4-6F175D3DCCD1}">
-              <a14:hiddenFill xmlns:a14="http://schemas.microsoft.com/office/drawing/2010/main" xmlns="">
+              <a14:hiddenFill xmlns:a14="http://schemas.microsoft.com/office/drawing/2010/main">
                 <a:solidFill>
                   <a:srgbClr val="FFFFFF"/>
                 </a:solidFill>
               </a14:hiddenFill>
             </a:ext>
             <a:ext uri="{91240B29-F687-4f45-9708-019B960494DF}">
-              <a14:hiddenLine xmlns:a14="http://schemas.microsoft.com/office/drawing/2010/main" xmlns="" w="9525">
+              <a14:hiddenLine xmlns:a14="http://schemas.microsoft.com/office/drawing/2010/main" w="9525">
                 <a:solidFill>
                   <a:srgbClr val="000000"/>
                 </a:solidFill>
@@ -1454,7 +1454,7 @@
           <a:noFill/>
           <a:extLst>
             <a:ext uri="{909E8E84-426E-40dd-AFC4-6F175D3DCCD1}">
-              <a14:hiddenFill xmlns:a14="http://schemas.microsoft.com/office/drawing/2010/main" xmlns="">
+              <a14:hiddenFill xmlns:a14="http://schemas.microsoft.com/office/drawing/2010/main">
                 <a:solidFill>
                   <a:srgbClr val="FFFFFF"/>
                 </a:solidFill>
@@ -1808,14 +1808,14 @@
           </a:ln>
           <a:extLst>
             <a:ext uri="{909E8E84-426E-40dd-AFC4-6F175D3DCCD1}">
-              <a14:hiddenFill xmlns:a14="http://schemas.microsoft.com/office/drawing/2010/main" xmlns="">
+              <a14:hiddenFill xmlns:a14="http://schemas.microsoft.com/office/drawing/2010/main">
                 <a:solidFill>
                   <a:srgbClr val="FFFFFF"/>
                 </a:solidFill>
               </a14:hiddenFill>
             </a:ext>
             <a:ext uri="{91240B29-F687-4f45-9708-019B960494DF}">
-              <a14:hiddenLine xmlns:a14="http://schemas.microsoft.com/office/drawing/2010/main" xmlns="" w="9525">
+              <a14:hiddenLine xmlns:a14="http://schemas.microsoft.com/office/drawing/2010/main" w="9525">
                 <a:solidFill>
                   <a:srgbClr val="000000"/>
                 </a:solidFill>
@@ -1866,7 +1866,7 @@
           <a:noFill/>
           <a:extLst>
             <a:ext uri="{909E8E84-426E-40dd-AFC4-6F175D3DCCD1}">
-              <a14:hiddenFill xmlns:a14="http://schemas.microsoft.com/office/drawing/2010/main" xmlns="">
+              <a14:hiddenFill xmlns:a14="http://schemas.microsoft.com/office/drawing/2010/main">
                 <a:solidFill>
                   <a:srgbClr val="FFFFFF"/>
                 </a:solidFill>
@@ -2056,14 +2056,14 @@
           </a:ln>
           <a:extLst>
             <a:ext uri="{909E8E84-426E-40dd-AFC4-6F175D3DCCD1}">
-              <a14:hiddenFill xmlns:a14="http://schemas.microsoft.com/office/drawing/2010/main" xmlns="">
+              <a14:hiddenFill xmlns:a14="http://schemas.microsoft.com/office/drawing/2010/main">
                 <a:solidFill>
                   <a:srgbClr val="FFFFFF"/>
                 </a:solidFill>
               </a14:hiddenFill>
             </a:ext>
             <a:ext uri="{91240B29-F687-4f45-9708-019B960494DF}">
-              <a14:hiddenLine xmlns:a14="http://schemas.microsoft.com/office/drawing/2010/main" xmlns="" w="9525">
+              <a14:hiddenLine xmlns:a14="http://schemas.microsoft.com/office/drawing/2010/main" w="9525">
                 <a:solidFill>
                   <a:srgbClr val="000000"/>
                 </a:solidFill>
@@ -2352,7 +2352,7 @@
           <a:noFill/>
           <a:extLst>
             <a:ext uri="{909E8E84-426E-40dd-AFC4-6F175D3DCCD1}">
-              <a14:hiddenFill xmlns:a14="http://schemas.microsoft.com/office/drawing/2010/main" xmlns="">
+              <a14:hiddenFill xmlns:a14="http://schemas.microsoft.com/office/drawing/2010/main">
                 <a:solidFill>
                   <a:srgbClr val="FFFFFF"/>
                 </a:solidFill>
@@ -2396,14 +2396,14 @@
           </a:ln>
           <a:extLst>
             <a:ext uri="{909E8E84-426E-40dd-AFC4-6F175D3DCCD1}">
-              <a14:hiddenFill xmlns:a14="http://schemas.microsoft.com/office/drawing/2010/main" xmlns="">
+              <a14:hiddenFill xmlns:a14="http://schemas.microsoft.com/office/drawing/2010/main">
                 <a:solidFill>
                   <a:srgbClr val="FFFFFF"/>
                 </a:solidFill>
               </a14:hiddenFill>
             </a:ext>
             <a:ext uri="{91240B29-F687-4f45-9708-019B960494DF}">
-              <a14:hiddenLine xmlns:a14="http://schemas.microsoft.com/office/drawing/2010/main" xmlns="" w="9525">
+              <a14:hiddenLine xmlns:a14="http://schemas.microsoft.com/office/drawing/2010/main" w="9525">
                 <a:solidFill>
                   <a:srgbClr val="000000"/>
                 </a:solidFill>
@@ -2474,14 +2474,14 @@
           </a:ln>
           <a:extLst>
             <a:ext uri="{909E8E84-426E-40dd-AFC4-6F175D3DCCD1}">
-              <a14:hiddenFill xmlns:a14="http://schemas.microsoft.com/office/drawing/2010/main" xmlns="">
+              <a14:hiddenFill xmlns:a14="http://schemas.microsoft.com/office/drawing/2010/main">
                 <a:solidFill>
                   <a:srgbClr val="FFFFFF"/>
                 </a:solidFill>
               </a14:hiddenFill>
             </a:ext>
             <a:ext uri="{91240B29-F687-4f45-9708-019B960494DF}">
-              <a14:hiddenLine xmlns:a14="http://schemas.microsoft.com/office/drawing/2010/main" xmlns="" w="9525">
+              <a14:hiddenLine xmlns:a14="http://schemas.microsoft.com/office/drawing/2010/main" w="9525">
                 <a:solidFill>
                   <a:srgbClr val="000000"/>
                 </a:solidFill>
@@ -2532,14 +2532,14 @@
           </a:ln>
           <a:extLst>
             <a:ext uri="{909E8E84-426E-40dd-AFC4-6F175D3DCCD1}">
-              <a14:hiddenFill xmlns:a14="http://schemas.microsoft.com/office/drawing/2010/main" xmlns="">
+              <a14:hiddenFill xmlns:a14="http://schemas.microsoft.com/office/drawing/2010/main">
                 <a:solidFill>
                   <a:srgbClr val="FFFFFF"/>
                 </a:solidFill>
               </a14:hiddenFill>
             </a:ext>
             <a:ext uri="{91240B29-F687-4f45-9708-019B960494DF}">
-              <a14:hiddenLine xmlns:a14="http://schemas.microsoft.com/office/drawing/2010/main" xmlns="" w="9525">
+              <a14:hiddenLine xmlns:a14="http://schemas.microsoft.com/office/drawing/2010/main" w="9525">
                 <a:solidFill>
                   <a:srgbClr val="000000"/>
                 </a:solidFill>
@@ -2687,7 +2687,7 @@
               <a:pPr>
                 <a:defRPr/>
               </a:pPr>
-              <a:t>8/16/2020</a:t>
+              <a:t>8/23/20</a:t>
             </a:fld>
             <a:endParaRPr lang="en-US" dirty="0"/>
           </a:p>
@@ -3192,7 +3192,7 @@
                   <a:srgbClr val="B30000"/>
                 </a:solidFill>
               </a:rPr>
-              <a:t>EGR 1330</a:t>
+              <a:t>ENGR 1330</a:t>
             </a:r>
             <a:br>
               <a:rPr lang="en-US" sz="4400" b="1" dirty="0">
@@ -3218,7 +3218,7 @@
           <p:cNvPr id="3" name="TextBox 2">
             <a:extLst>
               <a:ext uri="{FF2B5EF4-FFF2-40B4-BE49-F238E27FC236}">
-                <a16:creationId xmlns:a16="http://schemas.microsoft.com/office/drawing/2014/main" id="{C65C3A2D-DA05-4078-8BAA-8CD82F612D28}"/>
+                <a16:creationId xmlns:a16="http://schemas.microsoft.com/office/drawing/2014/main" xmlns="" id="{C65C3A2D-DA05-4078-8BAA-8CD82F612D28}"/>
               </a:ext>
             </a:extLst>
           </p:cNvPr>
@@ -3247,7 +3247,20 @@
                 <a:latin typeface="Times New Roman" panose="02020603050405020304" pitchFamily="18" charset="0"/>
                 <a:cs typeface="Times New Roman" panose="02020603050405020304" pitchFamily="18" charset="0"/>
               </a:rPr>
-              <a:t>Introduction to Computational Thinking with Data Science</a:t>
+              <a:t>Computational Thinking and </a:t>
+            </a:r>
+            <a:br>
+              <a:rPr lang="en-US" sz="4000" dirty="0">
+                <a:latin typeface="Times New Roman" panose="02020603050405020304" pitchFamily="18" charset="0"/>
+                <a:cs typeface="Times New Roman" panose="02020603050405020304" pitchFamily="18" charset="0"/>
+              </a:rPr>
+            </a:br>
+            <a:r>
+              <a:rPr lang="en-US" sz="4000" dirty="0">
+                <a:latin typeface="Times New Roman" panose="02020603050405020304" pitchFamily="18" charset="0"/>
+                <a:cs typeface="Times New Roman" panose="02020603050405020304" pitchFamily="18" charset="0"/>
+              </a:rPr>
+              <a:t>Data Science</a:t>
             </a:r>
           </a:p>
         </p:txBody>
@@ -3287,7 +3300,7 @@
           <p:cNvPr id="2" name="Content Placeholder 1">
             <a:extLst>
               <a:ext uri="{FF2B5EF4-FFF2-40B4-BE49-F238E27FC236}">
-                <a16:creationId xmlns:a16="http://schemas.microsoft.com/office/drawing/2014/main" id="{FAF66B30-5F6F-447E-B8E7-6E99B40AA768}"/>
+                <a16:creationId xmlns:a16="http://schemas.microsoft.com/office/drawing/2014/main" xmlns="" id="{FAF66B30-5F6F-447E-B8E7-6E99B40AA768}"/>
               </a:ext>
             </a:extLst>
           </p:cNvPr>
@@ -3583,7 +3596,7 @@
           <p:cNvPr id="3" name="Slide Number Placeholder 2">
             <a:extLst>
               <a:ext uri="{FF2B5EF4-FFF2-40B4-BE49-F238E27FC236}">
-                <a16:creationId xmlns:a16="http://schemas.microsoft.com/office/drawing/2014/main" id="{2E6C01B4-37B8-4648-B9E4-2503B4A8F6C9}"/>
+                <a16:creationId xmlns:a16="http://schemas.microsoft.com/office/drawing/2014/main" xmlns="" id="{2E6C01B4-37B8-4648-B9E4-2503B4A8F6C9}"/>
               </a:ext>
             </a:extLst>
           </p:cNvPr>
@@ -3618,7 +3631,7 @@
           <p:cNvPr id="4" name="Title 3">
             <a:extLst>
               <a:ext uri="{FF2B5EF4-FFF2-40B4-BE49-F238E27FC236}">
-                <a16:creationId xmlns:a16="http://schemas.microsoft.com/office/drawing/2014/main" id="{3C07A0A0-51C2-465E-B4F1-A07C8793D7E7}"/>
+                <a16:creationId xmlns:a16="http://schemas.microsoft.com/office/drawing/2014/main" xmlns="" id="{3C07A0A0-51C2-465E-B4F1-A07C8793D7E7}"/>
               </a:ext>
             </a:extLst>
           </p:cNvPr>
@@ -3676,7 +3689,7 @@
           <p:cNvPr id="2" name="Content Placeholder 1">
             <a:extLst>
               <a:ext uri="{FF2B5EF4-FFF2-40B4-BE49-F238E27FC236}">
-                <a16:creationId xmlns:a16="http://schemas.microsoft.com/office/drawing/2014/main" id="{FAF66B30-5F6F-447E-B8E7-6E99B40AA768}"/>
+                <a16:creationId xmlns:a16="http://schemas.microsoft.com/office/drawing/2014/main" xmlns="" id="{FAF66B30-5F6F-447E-B8E7-6E99B40AA768}"/>
               </a:ext>
             </a:extLst>
           </p:cNvPr>
@@ -3893,7 +3906,7 @@
           <p:cNvPr id="3" name="Slide Number Placeholder 2">
             <a:extLst>
               <a:ext uri="{FF2B5EF4-FFF2-40B4-BE49-F238E27FC236}">
-                <a16:creationId xmlns:a16="http://schemas.microsoft.com/office/drawing/2014/main" id="{2E6C01B4-37B8-4648-B9E4-2503B4A8F6C9}"/>
+                <a16:creationId xmlns:a16="http://schemas.microsoft.com/office/drawing/2014/main" xmlns="" id="{2E6C01B4-37B8-4648-B9E4-2503B4A8F6C9}"/>
               </a:ext>
             </a:extLst>
           </p:cNvPr>
@@ -3928,7 +3941,7 @@
           <p:cNvPr id="4" name="Title 3">
             <a:extLst>
               <a:ext uri="{FF2B5EF4-FFF2-40B4-BE49-F238E27FC236}">
-                <a16:creationId xmlns:a16="http://schemas.microsoft.com/office/drawing/2014/main" id="{3C07A0A0-51C2-465E-B4F1-A07C8793D7E7}"/>
+                <a16:creationId xmlns:a16="http://schemas.microsoft.com/office/drawing/2014/main" xmlns="" id="{3C07A0A0-51C2-465E-B4F1-A07C8793D7E7}"/>
               </a:ext>
             </a:extLst>
           </p:cNvPr>
@@ -3986,7 +3999,7 @@
           <p:cNvPr id="2" name="Content Placeholder 1">
             <a:extLst>
               <a:ext uri="{FF2B5EF4-FFF2-40B4-BE49-F238E27FC236}">
-                <a16:creationId xmlns:a16="http://schemas.microsoft.com/office/drawing/2014/main" id="{644932FE-E1DD-4FCE-9E17-43AB99B678D2}"/>
+                <a16:creationId xmlns:a16="http://schemas.microsoft.com/office/drawing/2014/main" xmlns="" id="{644932FE-E1DD-4FCE-9E17-43AB99B678D2}"/>
               </a:ext>
             </a:extLst>
           </p:cNvPr>
@@ -4032,7 +4045,7 @@
           <p:cNvPr id="3" name="Slide Number Placeholder 2">
             <a:extLst>
               <a:ext uri="{FF2B5EF4-FFF2-40B4-BE49-F238E27FC236}">
-                <a16:creationId xmlns:a16="http://schemas.microsoft.com/office/drawing/2014/main" id="{666D3328-0F4D-4B71-84FA-F1E6021202B0}"/>
+                <a16:creationId xmlns:a16="http://schemas.microsoft.com/office/drawing/2014/main" xmlns="" id="{666D3328-0F4D-4B71-84FA-F1E6021202B0}"/>
               </a:ext>
             </a:extLst>
           </p:cNvPr>
@@ -4067,7 +4080,7 @@
           <p:cNvPr id="4" name="Title 3">
             <a:extLst>
               <a:ext uri="{FF2B5EF4-FFF2-40B4-BE49-F238E27FC236}">
-                <a16:creationId xmlns:a16="http://schemas.microsoft.com/office/drawing/2014/main" id="{26FFA093-BEF9-45B3-9A8F-5251A51FC3C1}"/>
+                <a16:creationId xmlns:a16="http://schemas.microsoft.com/office/drawing/2014/main" xmlns="" id="{26FFA093-BEF9-45B3-9A8F-5251A51FC3C1}"/>
               </a:ext>
             </a:extLst>
           </p:cNvPr>
@@ -4125,7 +4138,7 @@
           <p:cNvPr id="2" name="Content Placeholder 1">
             <a:extLst>
               <a:ext uri="{FF2B5EF4-FFF2-40B4-BE49-F238E27FC236}">
-                <a16:creationId xmlns:a16="http://schemas.microsoft.com/office/drawing/2014/main" id="{9B5B3508-4A1C-48EB-B408-1ED6835C1CCA}"/>
+                <a16:creationId xmlns:a16="http://schemas.microsoft.com/office/drawing/2014/main" xmlns="" id="{9B5B3508-4A1C-48EB-B408-1ED6835C1CCA}"/>
               </a:ext>
             </a:extLst>
           </p:cNvPr>
@@ -4300,7 +4313,7 @@
           <p:cNvPr id="3" name="Slide Number Placeholder 2">
             <a:extLst>
               <a:ext uri="{FF2B5EF4-FFF2-40B4-BE49-F238E27FC236}">
-                <a16:creationId xmlns:a16="http://schemas.microsoft.com/office/drawing/2014/main" id="{00AF353D-C21D-45D4-9460-D97E4FBC1DBC}"/>
+                <a16:creationId xmlns:a16="http://schemas.microsoft.com/office/drawing/2014/main" xmlns="" id="{00AF353D-C21D-45D4-9460-D97E4FBC1DBC}"/>
               </a:ext>
             </a:extLst>
           </p:cNvPr>
@@ -4335,7 +4348,7 @@
           <p:cNvPr id="4" name="Title 3">
             <a:extLst>
               <a:ext uri="{FF2B5EF4-FFF2-40B4-BE49-F238E27FC236}">
-                <a16:creationId xmlns:a16="http://schemas.microsoft.com/office/drawing/2014/main" id="{2A4C28CF-E594-41E0-BB0D-50FD4C8D5A62}"/>
+                <a16:creationId xmlns:a16="http://schemas.microsoft.com/office/drawing/2014/main" xmlns="" id="{2A4C28CF-E594-41E0-BB0D-50FD4C8D5A62}"/>
               </a:ext>
             </a:extLst>
           </p:cNvPr>
@@ -4393,7 +4406,7 @@
           <p:cNvPr id="2" name="Content Placeholder 1">
             <a:extLst>
               <a:ext uri="{FF2B5EF4-FFF2-40B4-BE49-F238E27FC236}">
-                <a16:creationId xmlns:a16="http://schemas.microsoft.com/office/drawing/2014/main" id="{5CB7617F-6F60-4556-886F-58499ED4DB01}"/>
+                <a16:creationId xmlns:a16="http://schemas.microsoft.com/office/drawing/2014/main" xmlns="" id="{5CB7617F-6F60-4556-886F-58499ED4DB01}"/>
               </a:ext>
             </a:extLst>
           </p:cNvPr>
@@ -4467,7 +4480,7 @@
           <p:cNvPr id="3" name="Slide Number Placeholder 2">
             <a:extLst>
               <a:ext uri="{FF2B5EF4-FFF2-40B4-BE49-F238E27FC236}">
-                <a16:creationId xmlns:a16="http://schemas.microsoft.com/office/drawing/2014/main" id="{014453C3-91C5-4BCF-AFC1-1BFD5AF631FE}"/>
+                <a16:creationId xmlns:a16="http://schemas.microsoft.com/office/drawing/2014/main" xmlns="" id="{014453C3-91C5-4BCF-AFC1-1BFD5AF631FE}"/>
               </a:ext>
             </a:extLst>
           </p:cNvPr>
@@ -4502,7 +4515,7 @@
           <p:cNvPr id="4" name="Title 3">
             <a:extLst>
               <a:ext uri="{FF2B5EF4-FFF2-40B4-BE49-F238E27FC236}">
-                <a16:creationId xmlns:a16="http://schemas.microsoft.com/office/drawing/2014/main" id="{DECC9A68-44F6-4A75-A681-2BAD640FDF16}"/>
+                <a16:creationId xmlns:a16="http://schemas.microsoft.com/office/drawing/2014/main" xmlns="" id="{DECC9A68-44F6-4A75-A681-2BAD640FDF16}"/>
               </a:ext>
             </a:extLst>
           </p:cNvPr>
@@ -4560,7 +4573,7 @@
           <p:cNvPr id="2" name="Content Placeholder 1">
             <a:extLst>
               <a:ext uri="{FF2B5EF4-FFF2-40B4-BE49-F238E27FC236}">
-                <a16:creationId xmlns:a16="http://schemas.microsoft.com/office/drawing/2014/main" id="{EE3765D9-935B-46C9-8A09-3C91AED1B7FF}"/>
+                <a16:creationId xmlns:a16="http://schemas.microsoft.com/office/drawing/2014/main" xmlns="" id="{EE3765D9-935B-46C9-8A09-3C91AED1B7FF}"/>
               </a:ext>
             </a:extLst>
           </p:cNvPr>
@@ -4666,7 +4679,7 @@
           <p:cNvPr id="3" name="Slide Number Placeholder 2">
             <a:extLst>
               <a:ext uri="{FF2B5EF4-FFF2-40B4-BE49-F238E27FC236}">
-                <a16:creationId xmlns:a16="http://schemas.microsoft.com/office/drawing/2014/main" id="{AF466E76-1EFC-4F87-9F0D-5E332F031E20}"/>
+                <a16:creationId xmlns:a16="http://schemas.microsoft.com/office/drawing/2014/main" xmlns="" id="{AF466E76-1EFC-4F87-9F0D-5E332F031E20}"/>
               </a:ext>
             </a:extLst>
           </p:cNvPr>
@@ -4701,7 +4714,7 @@
           <p:cNvPr id="4" name="Title 3">
             <a:extLst>
               <a:ext uri="{FF2B5EF4-FFF2-40B4-BE49-F238E27FC236}">
-                <a16:creationId xmlns:a16="http://schemas.microsoft.com/office/drawing/2014/main" id="{BA4DA8D0-C61D-4262-A05B-BBA50F9BEF17}"/>
+                <a16:creationId xmlns:a16="http://schemas.microsoft.com/office/drawing/2014/main" xmlns="" id="{BA4DA8D0-C61D-4262-A05B-BBA50F9BEF17}"/>
               </a:ext>
             </a:extLst>
           </p:cNvPr>
@@ -4759,7 +4772,7 @@
           <p:cNvPr id="2" name="Content Placeholder 1">
             <a:extLst>
               <a:ext uri="{FF2B5EF4-FFF2-40B4-BE49-F238E27FC236}">
-                <a16:creationId xmlns:a16="http://schemas.microsoft.com/office/drawing/2014/main" id="{2DE60409-3F92-4892-BFA2-1B01CD8B215F}"/>
+                <a16:creationId xmlns:a16="http://schemas.microsoft.com/office/drawing/2014/main" xmlns="" id="{2DE60409-3F92-4892-BFA2-1B01CD8B215F}"/>
               </a:ext>
             </a:extLst>
           </p:cNvPr>
@@ -4801,7 +4814,7 @@
           <p:cNvPr id="3" name="Slide Number Placeholder 2">
             <a:extLst>
               <a:ext uri="{FF2B5EF4-FFF2-40B4-BE49-F238E27FC236}">
-                <a16:creationId xmlns:a16="http://schemas.microsoft.com/office/drawing/2014/main" id="{E9036F20-D96B-47F1-94C8-4E7C1C01A7E3}"/>
+                <a16:creationId xmlns:a16="http://schemas.microsoft.com/office/drawing/2014/main" xmlns="" id="{E9036F20-D96B-47F1-94C8-4E7C1C01A7E3}"/>
               </a:ext>
             </a:extLst>
           </p:cNvPr>
@@ -4836,7 +4849,7 @@
           <p:cNvPr id="4" name="Title 3">
             <a:extLst>
               <a:ext uri="{FF2B5EF4-FFF2-40B4-BE49-F238E27FC236}">
-                <a16:creationId xmlns:a16="http://schemas.microsoft.com/office/drawing/2014/main" id="{8703BD40-6E98-4C41-BE8F-A5F65DFE56FF}"/>
+                <a16:creationId xmlns:a16="http://schemas.microsoft.com/office/drawing/2014/main" xmlns="" id="{8703BD40-6E98-4C41-BE8F-A5F65DFE56FF}"/>
               </a:ext>
             </a:extLst>
           </p:cNvPr>
@@ -4902,7 +4915,7 @@
           <p:cNvPr id="2" name="Content Placeholder 1">
             <a:extLst>
               <a:ext uri="{FF2B5EF4-FFF2-40B4-BE49-F238E27FC236}">
-                <a16:creationId xmlns:a16="http://schemas.microsoft.com/office/drawing/2014/main" id="{DA1CABC4-37C7-4328-BDAA-8381040AF1DA}"/>
+                <a16:creationId xmlns:a16="http://schemas.microsoft.com/office/drawing/2014/main" xmlns="" id="{DA1CABC4-37C7-4328-BDAA-8381040AF1DA}"/>
               </a:ext>
             </a:extLst>
           </p:cNvPr>
@@ -5040,7 +5053,7 @@
           <p:cNvPr id="3" name="Slide Number Placeholder 2">
             <a:extLst>
               <a:ext uri="{FF2B5EF4-FFF2-40B4-BE49-F238E27FC236}">
-                <a16:creationId xmlns:a16="http://schemas.microsoft.com/office/drawing/2014/main" id="{F9077546-A249-42E7-B0A3-613070744846}"/>
+                <a16:creationId xmlns:a16="http://schemas.microsoft.com/office/drawing/2014/main" xmlns="" id="{F9077546-A249-42E7-B0A3-613070744846}"/>
               </a:ext>
             </a:extLst>
           </p:cNvPr>
@@ -5075,7 +5088,7 @@
           <p:cNvPr id="4" name="Title 3">
             <a:extLst>
               <a:ext uri="{FF2B5EF4-FFF2-40B4-BE49-F238E27FC236}">
-                <a16:creationId xmlns:a16="http://schemas.microsoft.com/office/drawing/2014/main" id="{430AE034-DD58-4DD8-8A53-D0E4F118624E}"/>
+                <a16:creationId xmlns:a16="http://schemas.microsoft.com/office/drawing/2014/main" xmlns="" id="{430AE034-DD58-4DD8-8A53-D0E4F118624E}"/>
               </a:ext>
             </a:extLst>
           </p:cNvPr>
@@ -5133,7 +5146,7 @@
           <p:cNvPr id="3" name="Slide Number Placeholder 2">
             <a:extLst>
               <a:ext uri="{FF2B5EF4-FFF2-40B4-BE49-F238E27FC236}">
-                <a16:creationId xmlns:a16="http://schemas.microsoft.com/office/drawing/2014/main" id="{6376EF33-8814-4F9F-B587-41119EE30082}"/>
+                <a16:creationId xmlns:a16="http://schemas.microsoft.com/office/drawing/2014/main" xmlns="" id="{6376EF33-8814-4F9F-B587-41119EE30082}"/>
               </a:ext>
             </a:extLst>
           </p:cNvPr>
@@ -5168,7 +5181,7 @@
           <p:cNvPr id="4" name="Title 3">
             <a:extLst>
               <a:ext uri="{FF2B5EF4-FFF2-40B4-BE49-F238E27FC236}">
-                <a16:creationId xmlns:a16="http://schemas.microsoft.com/office/drawing/2014/main" id="{7D41E5E4-7998-4CBA-8A58-32ACEF1FDFF3}"/>
+                <a16:creationId xmlns:a16="http://schemas.microsoft.com/office/drawing/2014/main" xmlns="" id="{7D41E5E4-7998-4CBA-8A58-32ACEF1FDFF3}"/>
               </a:ext>
             </a:extLst>
           </p:cNvPr>
@@ -5196,7 +5209,7 @@
           <p:cNvPr id="6" name="Picture 5">
             <a:extLst>
               <a:ext uri="{FF2B5EF4-FFF2-40B4-BE49-F238E27FC236}">
-                <a16:creationId xmlns:a16="http://schemas.microsoft.com/office/drawing/2014/main" id="{89ABB59E-D883-488A-A8E7-B899B596B828}"/>
+                <a16:creationId xmlns:a16="http://schemas.microsoft.com/office/drawing/2014/main" xmlns="" id="{89ABB59E-D883-488A-A8E7-B899B596B828}"/>
               </a:ext>
             </a:extLst>
           </p:cNvPr>
@@ -5256,7 +5269,7 @@
           <p:cNvPr id="2" name="Content Placeholder 1">
             <a:extLst>
               <a:ext uri="{FF2B5EF4-FFF2-40B4-BE49-F238E27FC236}">
-                <a16:creationId xmlns:a16="http://schemas.microsoft.com/office/drawing/2014/main" id="{DA1CABC4-37C7-4328-BDAA-8381040AF1DA}"/>
+                <a16:creationId xmlns:a16="http://schemas.microsoft.com/office/drawing/2014/main" xmlns="" id="{DA1CABC4-37C7-4328-BDAA-8381040AF1DA}"/>
               </a:ext>
             </a:extLst>
           </p:cNvPr>
@@ -5503,7 +5516,7 @@
           <p:cNvPr id="3" name="Slide Number Placeholder 2">
             <a:extLst>
               <a:ext uri="{FF2B5EF4-FFF2-40B4-BE49-F238E27FC236}">
-                <a16:creationId xmlns:a16="http://schemas.microsoft.com/office/drawing/2014/main" id="{F9077546-A249-42E7-B0A3-613070744846}"/>
+                <a16:creationId xmlns:a16="http://schemas.microsoft.com/office/drawing/2014/main" xmlns="" id="{F9077546-A249-42E7-B0A3-613070744846}"/>
               </a:ext>
             </a:extLst>
           </p:cNvPr>
@@ -5538,7 +5551,7 @@
           <p:cNvPr id="4" name="Title 3">
             <a:extLst>
               <a:ext uri="{FF2B5EF4-FFF2-40B4-BE49-F238E27FC236}">
-                <a16:creationId xmlns:a16="http://schemas.microsoft.com/office/drawing/2014/main" id="{430AE034-DD58-4DD8-8A53-D0E4F118624E}"/>
+                <a16:creationId xmlns:a16="http://schemas.microsoft.com/office/drawing/2014/main" xmlns="" id="{430AE034-DD58-4DD8-8A53-D0E4F118624E}"/>
               </a:ext>
             </a:extLst>
           </p:cNvPr>
@@ -5596,7 +5609,7 @@
           <p:cNvPr id="2" name="Content Placeholder 1">
             <a:extLst>
               <a:ext uri="{FF2B5EF4-FFF2-40B4-BE49-F238E27FC236}">
-                <a16:creationId xmlns:a16="http://schemas.microsoft.com/office/drawing/2014/main" id="{3AD5DFF3-E2C3-4A1C-BE65-65571DCCA1A1}"/>
+                <a16:creationId xmlns:a16="http://schemas.microsoft.com/office/drawing/2014/main" xmlns="" id="{3AD5DFF3-E2C3-4A1C-BE65-65571DCCA1A1}"/>
               </a:ext>
             </a:extLst>
           </p:cNvPr>
@@ -5666,7 +5679,7 @@
           <p:cNvPr id="3" name="Slide Number Placeholder 2">
             <a:extLst>
               <a:ext uri="{FF2B5EF4-FFF2-40B4-BE49-F238E27FC236}">
-                <a16:creationId xmlns:a16="http://schemas.microsoft.com/office/drawing/2014/main" id="{D2277BDA-F228-49B0-9254-1C3E238DDC91}"/>
+                <a16:creationId xmlns:a16="http://schemas.microsoft.com/office/drawing/2014/main" xmlns="" id="{D2277BDA-F228-49B0-9254-1C3E238DDC91}"/>
               </a:ext>
             </a:extLst>
           </p:cNvPr>
@@ -5701,7 +5714,7 @@
           <p:cNvPr id="4" name="Title 3">
             <a:extLst>
               <a:ext uri="{FF2B5EF4-FFF2-40B4-BE49-F238E27FC236}">
-                <a16:creationId xmlns:a16="http://schemas.microsoft.com/office/drawing/2014/main" id="{C20963BD-5F1B-4FC5-BCB1-3A3C296165A6}"/>
+                <a16:creationId xmlns:a16="http://schemas.microsoft.com/office/drawing/2014/main" xmlns="" id="{C20963BD-5F1B-4FC5-BCB1-3A3C296165A6}"/>
               </a:ext>
             </a:extLst>
           </p:cNvPr>
@@ -5759,7 +5772,7 @@
           <p:cNvPr id="2" name="Content Placeholder 1">
             <a:extLst>
               <a:ext uri="{FF2B5EF4-FFF2-40B4-BE49-F238E27FC236}">
-                <a16:creationId xmlns:a16="http://schemas.microsoft.com/office/drawing/2014/main" id="{F2CB9177-08CA-4839-BF3A-AC9A566236CC}"/>
+                <a16:creationId xmlns:a16="http://schemas.microsoft.com/office/drawing/2014/main" xmlns="" id="{F2CB9177-08CA-4839-BF3A-AC9A566236CC}"/>
               </a:ext>
             </a:extLst>
           </p:cNvPr>
@@ -5818,7 +5831,7 @@
           <p:cNvPr id="3" name="Slide Number Placeholder 2">
             <a:extLst>
               <a:ext uri="{FF2B5EF4-FFF2-40B4-BE49-F238E27FC236}">
-                <a16:creationId xmlns:a16="http://schemas.microsoft.com/office/drawing/2014/main" id="{6B900C85-0F5E-4BAB-B840-EDB7B1F2FB71}"/>
+                <a16:creationId xmlns:a16="http://schemas.microsoft.com/office/drawing/2014/main" xmlns="" id="{6B900C85-0F5E-4BAB-B840-EDB7B1F2FB71}"/>
               </a:ext>
             </a:extLst>
           </p:cNvPr>
@@ -5853,7 +5866,7 @@
           <p:cNvPr id="4" name="Title 3">
             <a:extLst>
               <a:ext uri="{FF2B5EF4-FFF2-40B4-BE49-F238E27FC236}">
-                <a16:creationId xmlns:a16="http://schemas.microsoft.com/office/drawing/2014/main" id="{16FBFE28-D0E3-4D75-A8D4-98AC5F88D5BB}"/>
+                <a16:creationId xmlns:a16="http://schemas.microsoft.com/office/drawing/2014/main" xmlns="" id="{16FBFE28-D0E3-4D75-A8D4-98AC5F88D5BB}"/>
               </a:ext>
             </a:extLst>
           </p:cNvPr>
@@ -5911,7 +5924,7 @@
           <p:cNvPr id="2" name="Content Placeholder 1">
             <a:extLst>
               <a:ext uri="{FF2B5EF4-FFF2-40B4-BE49-F238E27FC236}">
-                <a16:creationId xmlns:a16="http://schemas.microsoft.com/office/drawing/2014/main" id="{DA1CABC4-37C7-4328-BDAA-8381040AF1DA}"/>
+                <a16:creationId xmlns:a16="http://schemas.microsoft.com/office/drawing/2014/main" xmlns="" id="{DA1CABC4-37C7-4328-BDAA-8381040AF1DA}"/>
               </a:ext>
             </a:extLst>
           </p:cNvPr>
@@ -6092,7 +6105,7 @@
           <p:cNvPr id="3" name="Slide Number Placeholder 2">
             <a:extLst>
               <a:ext uri="{FF2B5EF4-FFF2-40B4-BE49-F238E27FC236}">
-                <a16:creationId xmlns:a16="http://schemas.microsoft.com/office/drawing/2014/main" id="{F9077546-A249-42E7-B0A3-613070744846}"/>
+                <a16:creationId xmlns:a16="http://schemas.microsoft.com/office/drawing/2014/main" xmlns="" id="{F9077546-A249-42E7-B0A3-613070744846}"/>
               </a:ext>
             </a:extLst>
           </p:cNvPr>
@@ -6127,7 +6140,7 @@
           <p:cNvPr id="4" name="Title 3">
             <a:extLst>
               <a:ext uri="{FF2B5EF4-FFF2-40B4-BE49-F238E27FC236}">
-                <a16:creationId xmlns:a16="http://schemas.microsoft.com/office/drawing/2014/main" id="{430AE034-DD58-4DD8-8A53-D0E4F118624E}"/>
+                <a16:creationId xmlns:a16="http://schemas.microsoft.com/office/drawing/2014/main" xmlns="" id="{430AE034-DD58-4DD8-8A53-D0E4F118624E}"/>
               </a:ext>
             </a:extLst>
           </p:cNvPr>
@@ -6420,7 +6433,7 @@
           <p:cNvPr id="2" name="Content Placeholder 1">
             <a:extLst>
               <a:ext uri="{FF2B5EF4-FFF2-40B4-BE49-F238E27FC236}">
-                <a16:creationId xmlns:a16="http://schemas.microsoft.com/office/drawing/2014/main" id="{FAF66B30-5F6F-447E-B8E7-6E99B40AA768}"/>
+                <a16:creationId xmlns:a16="http://schemas.microsoft.com/office/drawing/2014/main" xmlns="" id="{FAF66B30-5F6F-447E-B8E7-6E99B40AA768}"/>
               </a:ext>
             </a:extLst>
           </p:cNvPr>
@@ -6531,7 +6544,7 @@
           <p:cNvPr id="3" name="Slide Number Placeholder 2">
             <a:extLst>
               <a:ext uri="{FF2B5EF4-FFF2-40B4-BE49-F238E27FC236}">
-                <a16:creationId xmlns:a16="http://schemas.microsoft.com/office/drawing/2014/main" id="{2E6C01B4-37B8-4648-B9E4-2503B4A8F6C9}"/>
+                <a16:creationId xmlns:a16="http://schemas.microsoft.com/office/drawing/2014/main" xmlns="" id="{2E6C01B4-37B8-4648-B9E4-2503B4A8F6C9}"/>
               </a:ext>
             </a:extLst>
           </p:cNvPr>
@@ -6566,7 +6579,7 @@
           <p:cNvPr id="4" name="Title 3">
             <a:extLst>
               <a:ext uri="{FF2B5EF4-FFF2-40B4-BE49-F238E27FC236}">
-                <a16:creationId xmlns:a16="http://schemas.microsoft.com/office/drawing/2014/main" id="{3C07A0A0-51C2-465E-B4F1-A07C8793D7E7}"/>
+                <a16:creationId xmlns:a16="http://schemas.microsoft.com/office/drawing/2014/main" xmlns="" id="{3C07A0A0-51C2-465E-B4F1-A07C8793D7E7}"/>
               </a:ext>
             </a:extLst>
           </p:cNvPr>

</xml_diff>